<commit_message>
1 - Refactory no artefato siplad-gateway, para importar o artefato siplad-service-core. 2 - Incremento no Power Point da Arquitetura Siplad V3
</commit_message>
<xml_diff>
--- a/Arquitetura Siplad V3.pptx
+++ b/Arquitetura Siplad V3.pptx
@@ -10,6 +10,15 @@
     <p:sldId id="258" r:id="rId4"/>
     <p:sldId id="259" r:id="rId5"/>
     <p:sldId id="260" r:id="rId6"/>
+    <p:sldId id="261" r:id="rId7"/>
+    <p:sldId id="262" r:id="rId8"/>
+    <p:sldId id="263" r:id="rId9"/>
+    <p:sldId id="264" r:id="rId10"/>
+    <p:sldId id="265" r:id="rId11"/>
+    <p:sldId id="266" r:id="rId12"/>
+    <p:sldId id="267" r:id="rId13"/>
+    <p:sldId id="268" r:id="rId14"/>
+    <p:sldId id="269" r:id="rId15"/>
   </p:sldIdLst>
   <p:sldSz cx="9144000" cy="6858000" type="screen4x3"/>
   <p:notesSz cx="6858000" cy="9144000"/>
@@ -292,7 +301,7 @@
           <a:p>
             <a:fld id="{A6EE9A10-A50F-4DF8-A376-09F6B29A9D9E}" type="datetimeFigureOut">
               <a:rPr lang="pt-BR" smtClean="0"/>
-              <a:t>02/04/2020</a:t>
+              <a:t>06/04/2020</a:t>
             </a:fld>
             <a:endParaRPr lang="pt-BR"/>
           </a:p>
@@ -462,7 +471,7 @@
           <a:p>
             <a:fld id="{A6EE9A10-A50F-4DF8-A376-09F6B29A9D9E}" type="datetimeFigureOut">
               <a:rPr lang="pt-BR" smtClean="0"/>
-              <a:t>02/04/2020</a:t>
+              <a:t>06/04/2020</a:t>
             </a:fld>
             <a:endParaRPr lang="pt-BR"/>
           </a:p>
@@ -642,7 +651,7 @@
           <a:p>
             <a:fld id="{A6EE9A10-A50F-4DF8-A376-09F6B29A9D9E}" type="datetimeFigureOut">
               <a:rPr lang="pt-BR" smtClean="0"/>
-              <a:t>02/04/2020</a:t>
+              <a:t>06/04/2020</a:t>
             </a:fld>
             <a:endParaRPr lang="pt-BR"/>
           </a:p>
@@ -812,7 +821,7 @@
           <a:p>
             <a:fld id="{A6EE9A10-A50F-4DF8-A376-09F6B29A9D9E}" type="datetimeFigureOut">
               <a:rPr lang="pt-BR" smtClean="0"/>
-              <a:t>02/04/2020</a:t>
+              <a:t>06/04/2020</a:t>
             </a:fld>
             <a:endParaRPr lang="pt-BR"/>
           </a:p>
@@ -1058,7 +1067,7 @@
           <a:p>
             <a:fld id="{A6EE9A10-A50F-4DF8-A376-09F6B29A9D9E}" type="datetimeFigureOut">
               <a:rPr lang="pt-BR" smtClean="0"/>
-              <a:t>02/04/2020</a:t>
+              <a:t>06/04/2020</a:t>
             </a:fld>
             <a:endParaRPr lang="pt-BR"/>
           </a:p>
@@ -1346,7 +1355,7 @@
           <a:p>
             <a:fld id="{A6EE9A10-A50F-4DF8-A376-09F6B29A9D9E}" type="datetimeFigureOut">
               <a:rPr lang="pt-BR" smtClean="0"/>
-              <a:t>02/04/2020</a:t>
+              <a:t>06/04/2020</a:t>
             </a:fld>
             <a:endParaRPr lang="pt-BR"/>
           </a:p>
@@ -1768,7 +1777,7 @@
           <a:p>
             <a:fld id="{A6EE9A10-A50F-4DF8-A376-09F6B29A9D9E}" type="datetimeFigureOut">
               <a:rPr lang="pt-BR" smtClean="0"/>
-              <a:t>02/04/2020</a:t>
+              <a:t>06/04/2020</a:t>
             </a:fld>
             <a:endParaRPr lang="pt-BR"/>
           </a:p>
@@ -1886,7 +1895,7 @@
           <a:p>
             <a:fld id="{A6EE9A10-A50F-4DF8-A376-09F6B29A9D9E}" type="datetimeFigureOut">
               <a:rPr lang="pt-BR" smtClean="0"/>
-              <a:t>02/04/2020</a:t>
+              <a:t>06/04/2020</a:t>
             </a:fld>
             <a:endParaRPr lang="pt-BR"/>
           </a:p>
@@ -1981,7 +1990,7 @@
           <a:p>
             <a:fld id="{A6EE9A10-A50F-4DF8-A376-09F6B29A9D9E}" type="datetimeFigureOut">
               <a:rPr lang="pt-BR" smtClean="0"/>
-              <a:t>02/04/2020</a:t>
+              <a:t>06/04/2020</a:t>
             </a:fld>
             <a:endParaRPr lang="pt-BR"/>
           </a:p>
@@ -2258,7 +2267,7 @@
           <a:p>
             <a:fld id="{A6EE9A10-A50F-4DF8-A376-09F6B29A9D9E}" type="datetimeFigureOut">
               <a:rPr lang="pt-BR" smtClean="0"/>
-              <a:t>02/04/2020</a:t>
+              <a:t>06/04/2020</a:t>
             </a:fld>
             <a:endParaRPr lang="pt-BR"/>
           </a:p>
@@ -2511,7 +2520,7 @@
           <a:p>
             <a:fld id="{A6EE9A10-A50F-4DF8-A376-09F6B29A9D9E}" type="datetimeFigureOut">
               <a:rPr lang="pt-BR" smtClean="0"/>
-              <a:t>02/04/2020</a:t>
+              <a:t>06/04/2020</a:t>
             </a:fld>
             <a:endParaRPr lang="pt-BR"/>
           </a:p>
@@ -2724,7 +2733,7 @@
           <a:p>
             <a:fld id="{A6EE9A10-A50F-4DF8-A376-09F6B29A9D9E}" type="datetimeFigureOut">
               <a:rPr lang="pt-BR" smtClean="0"/>
-              <a:t>02/04/2020</a:t>
+              <a:t>06/04/2020</a:t>
             </a:fld>
             <a:endParaRPr lang="pt-BR"/>
           </a:p>
@@ -3166,6 +3175,735 @@
 </p:sld>
 </file>
 
+<file path=ppt/slides/slide10.xml><?xml version="1.0" encoding="utf-8"?>
+<p:sld xmlns:a="http://schemas.openxmlformats.org/drawingml/2006/main" xmlns:r="http://schemas.openxmlformats.org/officeDocument/2006/relationships" xmlns:p="http://schemas.openxmlformats.org/presentationml/2006/main">
+  <p:cSld>
+    <p:spTree>
+      <p:nvGrpSpPr>
+        <p:cNvPr id="1" name=""/>
+        <p:cNvGrpSpPr/>
+        <p:nvPr/>
+      </p:nvGrpSpPr>
+      <p:grpSpPr>
+        <a:xfrm>
+          <a:off x="0" y="0"/>
+          <a:ext cx="0" cy="0"/>
+          <a:chOff x="0" y="0"/>
+          <a:chExt cx="0" cy="0"/>
+        </a:xfrm>
+      </p:grpSpPr>
+      <p:sp>
+        <p:nvSpPr>
+          <p:cNvPr id="2" name="Título 1"/>
+          <p:cNvSpPr>
+            <a:spLocks noGrp="1"/>
+          </p:cNvSpPr>
+          <p:nvPr>
+            <p:ph type="title"/>
+          </p:nvPr>
+        </p:nvSpPr>
+        <p:spPr/>
+        <p:txBody>
+          <a:bodyPr/>
+          <a:lstStyle/>
+          <a:p>
+            <a:r>
+              <a:rPr lang="pt-BR" dirty="0" smtClean="0"/>
+              <a:t>Artefatos</a:t>
+            </a:r>
+            <a:endParaRPr lang="pt-BR" dirty="0"/>
+          </a:p>
+        </p:txBody>
+      </p:sp>
+      <p:sp>
+        <p:nvSpPr>
+          <p:cNvPr id="3" name="Espaço Reservado para Conteúdo 2"/>
+          <p:cNvSpPr>
+            <a:spLocks noGrp="1"/>
+          </p:cNvSpPr>
+          <p:nvPr>
+            <p:ph idx="1"/>
+          </p:nvPr>
+        </p:nvSpPr>
+        <p:spPr/>
+        <p:txBody>
+          <a:bodyPr/>
+          <a:lstStyle/>
+          <a:p>
+            <a:r>
+              <a:rPr lang="pt-BR" dirty="0" smtClean="0"/>
+              <a:t>Os outros artefatos presentes, e os que vierem a ser implementados, fazem parte do negócio do sistema.</a:t>
+            </a:r>
+            <a:endParaRPr lang="pt-BR" dirty="0"/>
+          </a:p>
+        </p:txBody>
+      </p:sp>
+    </p:spTree>
+    <p:extLst>
+      <p:ext uri="{BB962C8B-B14F-4D97-AF65-F5344CB8AC3E}">
+        <p14:creationId xmlns:p14="http://schemas.microsoft.com/office/powerpoint/2010/main" val="2764276497"/>
+      </p:ext>
+    </p:extLst>
+  </p:cSld>
+  <p:clrMapOvr>
+    <a:masterClrMapping/>
+  </p:clrMapOvr>
+</p:sld>
+</file>
+
+<file path=ppt/slides/slide11.xml><?xml version="1.0" encoding="utf-8"?>
+<p:sld xmlns:a="http://schemas.openxmlformats.org/drawingml/2006/main" xmlns:r="http://schemas.openxmlformats.org/officeDocument/2006/relationships" xmlns:p="http://schemas.openxmlformats.org/presentationml/2006/main">
+  <p:cSld>
+    <p:spTree>
+      <p:nvGrpSpPr>
+        <p:cNvPr id="1" name=""/>
+        <p:cNvGrpSpPr/>
+        <p:nvPr/>
+      </p:nvGrpSpPr>
+      <p:grpSpPr>
+        <a:xfrm>
+          <a:off x="0" y="0"/>
+          <a:ext cx="0" cy="0"/>
+          <a:chOff x="0" y="0"/>
+          <a:chExt cx="0" cy="0"/>
+        </a:xfrm>
+      </p:grpSpPr>
+      <p:sp>
+        <p:nvSpPr>
+          <p:cNvPr id="2" name="Título 1"/>
+          <p:cNvSpPr>
+            <a:spLocks noGrp="1"/>
+          </p:cNvSpPr>
+          <p:nvPr>
+            <p:ph type="title"/>
+          </p:nvPr>
+        </p:nvSpPr>
+        <p:spPr/>
+        <p:txBody>
+          <a:bodyPr/>
+          <a:lstStyle/>
+          <a:p>
+            <a:r>
+              <a:rPr lang="pt-BR" dirty="0" smtClean="0"/>
+              <a:t>Ferramentas de Monitoramento</a:t>
+            </a:r>
+            <a:endParaRPr lang="pt-BR" dirty="0"/>
+          </a:p>
+        </p:txBody>
+      </p:sp>
+      <p:sp>
+        <p:nvSpPr>
+          <p:cNvPr id="3" name="Espaço Reservado para Conteúdo 2"/>
+          <p:cNvSpPr>
+            <a:spLocks noGrp="1"/>
+          </p:cNvSpPr>
+          <p:nvPr>
+            <p:ph idx="1"/>
+          </p:nvPr>
+        </p:nvSpPr>
+        <p:spPr/>
+        <p:txBody>
+          <a:bodyPr>
+            <a:normAutofit fontScale="92500"/>
+          </a:bodyPr>
+          <a:lstStyle/>
+          <a:p>
+            <a:r>
+              <a:rPr lang="pt-BR" dirty="0" smtClean="0"/>
+              <a:t>Para monitorar está sendo utilizado duas ferramentas open </a:t>
+            </a:r>
+            <a:r>
+              <a:rPr lang="pt-BR" dirty="0" err="1" smtClean="0"/>
+              <a:t>source</a:t>
+            </a:r>
+            <a:r>
+              <a:rPr lang="pt-BR" dirty="0" smtClean="0"/>
+              <a:t>.</a:t>
+            </a:r>
+            <a:br>
+              <a:rPr lang="pt-BR" dirty="0" smtClean="0"/>
+            </a:br>
+            <a:r>
+              <a:rPr lang="pt-BR" dirty="0" err="1" smtClean="0"/>
+              <a:t>Prometheus</a:t>
+            </a:r>
+            <a:r>
+              <a:rPr lang="pt-BR" dirty="0" smtClean="0"/>
+              <a:t> e </a:t>
+            </a:r>
+            <a:r>
+              <a:rPr lang="pt-BR" dirty="0" err="1" smtClean="0"/>
+              <a:t>Grafana</a:t>
+            </a:r>
+            <a:endParaRPr lang="pt-BR" dirty="0" smtClean="0"/>
+          </a:p>
+          <a:p>
+            <a:pPr lvl="1"/>
+            <a:r>
+              <a:rPr lang="pt-BR" dirty="0" err="1" smtClean="0"/>
+              <a:t>Prometheus</a:t>
+            </a:r>
+            <a:r>
+              <a:rPr lang="pt-BR" dirty="0" smtClean="0"/>
+              <a:t> é responsável por receber as métricas e armazená-las. Ele possui uma linguagem de consulta onde podemos extrair informações úteis das métricas</a:t>
+            </a:r>
+          </a:p>
+          <a:p>
+            <a:pPr lvl="1"/>
+            <a:r>
+              <a:rPr lang="pt-BR" dirty="0" err="1" smtClean="0"/>
+              <a:t>Grafana</a:t>
+            </a:r>
+            <a:r>
+              <a:rPr lang="pt-BR" dirty="0" smtClean="0"/>
+              <a:t> é a interface gráfica, que se conecta ao </a:t>
+            </a:r>
+            <a:r>
+              <a:rPr lang="pt-BR" dirty="0" err="1" smtClean="0"/>
+              <a:t>Prometheus</a:t>
+            </a:r>
+            <a:r>
+              <a:rPr lang="pt-BR" dirty="0" smtClean="0"/>
+              <a:t> e, através das queries, onde se cria os </a:t>
+            </a:r>
+            <a:r>
+              <a:rPr lang="pt-BR" dirty="0" err="1" smtClean="0"/>
+              <a:t>dashboards</a:t>
+            </a:r>
+            <a:r>
+              <a:rPr lang="pt-BR" dirty="0" smtClean="0"/>
+              <a:t/>
+            </a:r>
+            <a:br>
+              <a:rPr lang="pt-BR" dirty="0" smtClean="0"/>
+            </a:br>
+            <a:endParaRPr lang="pt-BR" dirty="0"/>
+          </a:p>
+        </p:txBody>
+      </p:sp>
+    </p:spTree>
+    <p:extLst>
+      <p:ext uri="{BB962C8B-B14F-4D97-AF65-F5344CB8AC3E}">
+        <p14:creationId xmlns:p14="http://schemas.microsoft.com/office/powerpoint/2010/main" val="977395279"/>
+      </p:ext>
+    </p:extLst>
+  </p:cSld>
+  <p:clrMapOvr>
+    <a:masterClrMapping/>
+  </p:clrMapOvr>
+</p:sld>
+</file>
+
+<file path=ppt/slides/slide12.xml><?xml version="1.0" encoding="utf-8"?>
+<p:sld xmlns:a="http://schemas.openxmlformats.org/drawingml/2006/main" xmlns:r="http://schemas.openxmlformats.org/officeDocument/2006/relationships" xmlns:p="http://schemas.openxmlformats.org/presentationml/2006/main">
+  <p:cSld>
+    <p:spTree>
+      <p:nvGrpSpPr>
+        <p:cNvPr id="1" name=""/>
+        <p:cNvGrpSpPr/>
+        <p:nvPr/>
+      </p:nvGrpSpPr>
+      <p:grpSpPr>
+        <a:xfrm>
+          <a:off x="0" y="0"/>
+          <a:ext cx="0" cy="0"/>
+          <a:chOff x="0" y="0"/>
+          <a:chExt cx="0" cy="0"/>
+        </a:xfrm>
+      </p:grpSpPr>
+      <p:sp>
+        <p:nvSpPr>
+          <p:cNvPr id="2" name="Título 1"/>
+          <p:cNvSpPr>
+            <a:spLocks noGrp="1"/>
+          </p:cNvSpPr>
+          <p:nvPr>
+            <p:ph type="title"/>
+          </p:nvPr>
+        </p:nvSpPr>
+        <p:spPr/>
+        <p:txBody>
+          <a:bodyPr/>
+          <a:lstStyle/>
+          <a:p>
+            <a:r>
+              <a:rPr lang="pt-BR" dirty="0" err="1" smtClean="0"/>
+              <a:t>Agragador</a:t>
+            </a:r>
+            <a:r>
+              <a:rPr lang="pt-BR" dirty="0" smtClean="0"/>
+              <a:t> de Logs</a:t>
+            </a:r>
+            <a:endParaRPr lang="pt-BR" dirty="0"/>
+          </a:p>
+        </p:txBody>
+      </p:sp>
+      <p:sp>
+        <p:nvSpPr>
+          <p:cNvPr id="3" name="Espaço Reservado para Conteúdo 2"/>
+          <p:cNvSpPr>
+            <a:spLocks noGrp="1"/>
+          </p:cNvSpPr>
+          <p:nvPr>
+            <p:ph idx="1"/>
+          </p:nvPr>
+        </p:nvSpPr>
+        <p:spPr/>
+        <p:txBody>
+          <a:bodyPr/>
+          <a:lstStyle/>
+          <a:p>
+            <a:r>
+              <a:rPr lang="pt-BR" sz="1800" dirty="0" smtClean="0"/>
+              <a:t>Como </a:t>
+            </a:r>
+            <a:r>
+              <a:rPr lang="pt-BR" sz="1800" dirty="0" err="1" smtClean="0"/>
+              <a:t>ferrameta</a:t>
+            </a:r>
+            <a:r>
+              <a:rPr lang="pt-BR" sz="1800" dirty="0" smtClean="0"/>
+              <a:t> para agregador de logs utilizamos o </a:t>
+            </a:r>
+            <a:r>
+              <a:rPr lang="pt-BR" sz="1800" dirty="0" err="1" smtClean="0"/>
+              <a:t>OpenZipkin</a:t>
+            </a:r>
+            <a:endParaRPr lang="pt-BR" sz="1800" dirty="0" smtClean="0"/>
+          </a:p>
+          <a:p>
+            <a:r>
+              <a:rPr lang="pt-BR" sz="1800" dirty="0" smtClean="0"/>
+              <a:t>O Spring Boot </a:t>
+            </a:r>
+            <a:r>
+              <a:rPr lang="pt-BR" sz="1800" dirty="0" err="1" smtClean="0"/>
+              <a:t>Cloud</a:t>
+            </a:r>
+            <a:r>
+              <a:rPr lang="pt-BR" sz="1800" dirty="0" smtClean="0"/>
+              <a:t> possui uma implementação para “</a:t>
+            </a:r>
+            <a:r>
+              <a:rPr lang="pt-BR" sz="1800" dirty="0" err="1" smtClean="0"/>
+              <a:t>tracing</a:t>
+            </a:r>
+            <a:r>
+              <a:rPr lang="pt-BR" sz="1800" dirty="0" smtClean="0"/>
+              <a:t> distribuído” chamado Spring </a:t>
+            </a:r>
+            <a:r>
+              <a:rPr lang="pt-BR" sz="1800" dirty="0" err="1" smtClean="0"/>
+              <a:t>Cloud</a:t>
+            </a:r>
+            <a:r>
+              <a:rPr lang="pt-BR" sz="1800" dirty="0" smtClean="0"/>
+              <a:t> </a:t>
+            </a:r>
+            <a:r>
+              <a:rPr lang="pt-BR" sz="1800" dirty="0" err="1" smtClean="0"/>
+              <a:t>Sleuth</a:t>
+            </a:r>
+            <a:r>
+              <a:rPr lang="pt-BR" sz="1800" dirty="0" smtClean="0"/>
+              <a:t>.</a:t>
+            </a:r>
+          </a:p>
+          <a:p>
+            <a:r>
+              <a:rPr lang="pt-BR" sz="1800" dirty="0" smtClean="0"/>
+              <a:t>Basta colocar a dependência no projeto e o </a:t>
+            </a:r>
+            <a:r>
+              <a:rPr lang="pt-BR" sz="1800" dirty="0" err="1" smtClean="0"/>
+              <a:t>Sleuth</a:t>
+            </a:r>
+            <a:r>
+              <a:rPr lang="pt-BR" sz="1800" dirty="0" smtClean="0"/>
+              <a:t> irá embutir no log um identificador de correlação ( </a:t>
+            </a:r>
+            <a:r>
+              <a:rPr lang="pt-BR" sz="1800" dirty="0" err="1" smtClean="0"/>
+              <a:t>correlationId</a:t>
+            </a:r>
+            <a:r>
+              <a:rPr lang="pt-BR" sz="1800" dirty="0" smtClean="0"/>
+              <a:t>), que será enviado junto com o cabeçalho, quando um serviço invocar um outro.</a:t>
+            </a:r>
+          </a:p>
+          <a:p>
+            <a:r>
+              <a:rPr lang="pt-BR" sz="1800" dirty="0" smtClean="0"/>
+              <a:t>Após configurar a aplicação, ela de tempos em tempos, enviará os logs para o </a:t>
+            </a:r>
+            <a:r>
+              <a:rPr lang="pt-BR" sz="1800" dirty="0" err="1" smtClean="0"/>
+              <a:t>Zipkin</a:t>
+            </a:r>
+            <a:r>
+              <a:rPr lang="pt-BR" sz="1800" dirty="0" smtClean="0"/>
+              <a:t>, que será responsável por agregar em uma ferramenta visual a chamada entre os serviços, o tempos que levou. </a:t>
+            </a:r>
+          </a:p>
+          <a:p>
+            <a:pPr marL="0" indent="0">
+              <a:buNone/>
+            </a:pPr>
+            <a:r>
+              <a:rPr lang="pt-BR" dirty="0" smtClean="0"/>
+              <a:t/>
+            </a:r>
+            <a:br>
+              <a:rPr lang="pt-BR" dirty="0" smtClean="0"/>
+            </a:br>
+            <a:endParaRPr lang="pt-BR" dirty="0"/>
+          </a:p>
+        </p:txBody>
+      </p:sp>
+    </p:spTree>
+    <p:extLst>
+      <p:ext uri="{BB962C8B-B14F-4D97-AF65-F5344CB8AC3E}">
+        <p14:creationId xmlns:p14="http://schemas.microsoft.com/office/powerpoint/2010/main" val="1896638067"/>
+      </p:ext>
+    </p:extLst>
+  </p:cSld>
+  <p:clrMapOvr>
+    <a:masterClrMapping/>
+  </p:clrMapOvr>
+</p:sld>
+</file>
+
+<file path=ppt/slides/slide13.xml><?xml version="1.0" encoding="utf-8"?>
+<p:sld xmlns:a="http://schemas.openxmlformats.org/drawingml/2006/main" xmlns:r="http://schemas.openxmlformats.org/officeDocument/2006/relationships" xmlns:p="http://schemas.openxmlformats.org/presentationml/2006/main">
+  <p:cSld>
+    <p:spTree>
+      <p:nvGrpSpPr>
+        <p:cNvPr id="1" name=""/>
+        <p:cNvGrpSpPr/>
+        <p:nvPr/>
+      </p:nvGrpSpPr>
+      <p:grpSpPr>
+        <a:xfrm>
+          <a:off x="0" y="0"/>
+          <a:ext cx="0" cy="0"/>
+          <a:chOff x="0" y="0"/>
+          <a:chExt cx="0" cy="0"/>
+        </a:xfrm>
+      </p:grpSpPr>
+      <p:sp>
+        <p:nvSpPr>
+          <p:cNvPr id="2" name="Título 1"/>
+          <p:cNvSpPr>
+            <a:spLocks noGrp="1"/>
+          </p:cNvSpPr>
+          <p:nvPr>
+            <p:ph type="title"/>
+          </p:nvPr>
+        </p:nvSpPr>
+        <p:spPr/>
+        <p:txBody>
+          <a:bodyPr/>
+          <a:lstStyle/>
+          <a:p>
+            <a:r>
+              <a:rPr lang="pt-BR" dirty="0" smtClean="0"/>
+              <a:t>Open </a:t>
+            </a:r>
+            <a:r>
+              <a:rPr lang="pt-BR" dirty="0" err="1" smtClean="0"/>
+              <a:t>Zipkin</a:t>
+            </a:r>
+            <a:endParaRPr lang="pt-BR" dirty="0"/>
+          </a:p>
+        </p:txBody>
+      </p:sp>
+      <p:sp>
+        <p:nvSpPr>
+          <p:cNvPr id="3" name="Espaço Reservado para Conteúdo 2"/>
+          <p:cNvSpPr>
+            <a:spLocks noGrp="1"/>
+          </p:cNvSpPr>
+          <p:nvPr>
+            <p:ph idx="1"/>
+          </p:nvPr>
+        </p:nvSpPr>
+        <p:spPr/>
+        <p:txBody>
+          <a:bodyPr>
+            <a:normAutofit/>
+          </a:bodyPr>
+          <a:lstStyle/>
+          <a:p>
+            <a:r>
+              <a:rPr lang="pt-BR" sz="1800" dirty="0" smtClean="0"/>
+              <a:t>Abaixo um exemplo do log agregado no </a:t>
+            </a:r>
+            <a:r>
+              <a:rPr lang="pt-BR" sz="1800" dirty="0" err="1" smtClean="0"/>
+              <a:t>Zipkin</a:t>
+            </a:r>
+            <a:r>
+              <a:rPr lang="pt-BR" sz="1800" dirty="0" smtClean="0"/>
+              <a:t>. A chamada foi feita ao serviço Apoio, através do gateway.</a:t>
+            </a:r>
+            <a:br>
+              <a:rPr lang="pt-BR" sz="1800" dirty="0" smtClean="0"/>
+            </a:br>
+            <a:endParaRPr lang="pt-BR" sz="1800" dirty="0"/>
+          </a:p>
+        </p:txBody>
+      </p:sp>
+      <p:pic>
+        <p:nvPicPr>
+          <p:cNvPr id="3075" name="Picture 3"/>
+          <p:cNvPicPr>
+            <a:picLocks noChangeAspect="1" noChangeArrowheads="1"/>
+          </p:cNvPicPr>
+          <p:nvPr/>
+        </p:nvPicPr>
+        <p:blipFill>
+          <a:blip r:embed="rId2">
+            <a:extLst>
+              <a:ext uri="{28A0092B-C50C-407E-A947-70E740481C1C}">
+                <a14:useLocalDpi xmlns:a14="http://schemas.microsoft.com/office/drawing/2010/main" val="0"/>
+              </a:ext>
+            </a:extLst>
+          </a:blip>
+          <a:srcRect/>
+          <a:stretch>
+            <a:fillRect/>
+          </a:stretch>
+        </p:blipFill>
+        <p:spPr bwMode="auto">
+          <a:xfrm>
+            <a:off x="107504" y="2492896"/>
+            <a:ext cx="8619885" cy="4016673"/>
+          </a:xfrm>
+          <a:prstGeom prst="rect">
+            <a:avLst/>
+          </a:prstGeom>
+          <a:noFill/>
+          <a:ln>
+            <a:noFill/>
+          </a:ln>
+          <a:extLst>
+            <a:ext uri="{909E8E84-426E-40DD-AFC4-6F175D3DCCD1}">
+              <a14:hiddenFill xmlns:a14="http://schemas.microsoft.com/office/drawing/2010/main">
+                <a:solidFill>
+                  <a:schemeClr val="accent1"/>
+                </a:solidFill>
+              </a14:hiddenFill>
+            </a:ext>
+            <a:ext uri="{91240B29-F687-4F45-9708-019B960494DF}">
+              <a14:hiddenLine xmlns:a14="http://schemas.microsoft.com/office/drawing/2010/main" w="9525">
+                <a:solidFill>
+                  <a:schemeClr val="tx1"/>
+                </a:solidFill>
+                <a:miter lim="800000"/>
+                <a:headEnd/>
+                <a:tailEnd/>
+              </a14:hiddenLine>
+            </a:ext>
+          </a:extLst>
+        </p:spPr>
+      </p:pic>
+    </p:spTree>
+    <p:extLst>
+      <p:ext uri="{BB962C8B-B14F-4D97-AF65-F5344CB8AC3E}">
+        <p14:creationId xmlns:p14="http://schemas.microsoft.com/office/powerpoint/2010/main" val="2375221237"/>
+      </p:ext>
+    </p:extLst>
+  </p:cSld>
+  <p:clrMapOvr>
+    <a:masterClrMapping/>
+  </p:clrMapOvr>
+</p:sld>
+</file>
+
+<file path=ppt/slides/slide14.xml><?xml version="1.0" encoding="utf-8"?>
+<p:sld xmlns:a="http://schemas.openxmlformats.org/drawingml/2006/main" xmlns:r="http://schemas.openxmlformats.org/officeDocument/2006/relationships" xmlns:p="http://schemas.openxmlformats.org/presentationml/2006/main">
+  <p:cSld>
+    <p:spTree>
+      <p:nvGrpSpPr>
+        <p:cNvPr id="1" name=""/>
+        <p:cNvGrpSpPr/>
+        <p:nvPr/>
+      </p:nvGrpSpPr>
+      <p:grpSpPr>
+        <a:xfrm>
+          <a:off x="0" y="0"/>
+          <a:ext cx="0" cy="0"/>
+          <a:chOff x="0" y="0"/>
+          <a:chExt cx="0" cy="0"/>
+        </a:xfrm>
+      </p:grpSpPr>
+      <p:sp>
+        <p:nvSpPr>
+          <p:cNvPr id="2" name="Título 1"/>
+          <p:cNvSpPr>
+            <a:spLocks noGrp="1"/>
+          </p:cNvSpPr>
+          <p:nvPr>
+            <p:ph type="title"/>
+          </p:nvPr>
+        </p:nvSpPr>
+        <p:spPr/>
+        <p:txBody>
+          <a:bodyPr/>
+          <a:lstStyle/>
+          <a:p>
+            <a:r>
+              <a:rPr lang="pt-BR" dirty="0" smtClean="0"/>
+              <a:t>Open </a:t>
+            </a:r>
+            <a:r>
+              <a:rPr lang="pt-BR" dirty="0" err="1" smtClean="0"/>
+              <a:t>Zipkin</a:t>
+            </a:r>
+            <a:endParaRPr lang="pt-BR" dirty="0"/>
+          </a:p>
+        </p:txBody>
+      </p:sp>
+      <p:sp>
+        <p:nvSpPr>
+          <p:cNvPr id="3" name="Espaço Reservado para Conteúdo 2"/>
+          <p:cNvSpPr>
+            <a:spLocks noGrp="1"/>
+          </p:cNvSpPr>
+          <p:nvPr>
+            <p:ph idx="1"/>
+          </p:nvPr>
+        </p:nvSpPr>
+        <p:spPr/>
+        <p:txBody>
+          <a:bodyPr>
+            <a:normAutofit/>
+          </a:bodyPr>
+          <a:lstStyle/>
+          <a:p>
+            <a:r>
+              <a:rPr lang="pt-BR" sz="1800" dirty="0" smtClean="0"/>
+              <a:t>Na próxima imagem vemos uma chamada ao serviço de teste através do gateway.</a:t>
+            </a:r>
+          </a:p>
+          <a:p>
+            <a:r>
+              <a:rPr lang="pt-BR" sz="1800" dirty="0" smtClean="0"/>
+              <a:t>As chamadas ao </a:t>
+            </a:r>
+            <a:r>
+              <a:rPr lang="pt-BR" sz="1800" dirty="0" err="1" smtClean="0"/>
+              <a:t>endpoint</a:t>
+            </a:r>
+            <a:r>
+              <a:rPr lang="pt-BR" sz="1800" dirty="0" smtClean="0"/>
+              <a:t> /v1/apoio/</a:t>
+            </a:r>
+            <a:r>
+              <a:rPr lang="pt-BR" sz="1800" dirty="0" err="1" smtClean="0"/>
+              <a:t>usuarios</a:t>
+            </a:r>
+            <a:r>
+              <a:rPr lang="pt-BR" sz="1800" dirty="0" smtClean="0"/>
+              <a:t>/</a:t>
+            </a:r>
+            <a:r>
+              <a:rPr lang="pt-BR" sz="1800" dirty="0" err="1" smtClean="0"/>
+              <a:t>getbyusername</a:t>
+            </a:r>
+            <a:r>
+              <a:rPr lang="pt-BR" sz="1800" dirty="0" smtClean="0"/>
+              <a:t> é feita pelo </a:t>
+            </a:r>
+            <a:r>
+              <a:rPr lang="pt-BR" sz="1800" dirty="0" err="1" smtClean="0"/>
+              <a:t>SpringSecurity</a:t>
+            </a:r>
+            <a:r>
+              <a:rPr lang="pt-BR" sz="1800" dirty="0" smtClean="0"/>
+              <a:t> no momento da validação do TOKEN JWT</a:t>
+            </a:r>
+            <a:br>
+              <a:rPr lang="pt-BR" sz="1800" dirty="0" smtClean="0"/>
+            </a:br>
+            <a:r>
+              <a:rPr lang="pt-BR" sz="1800" dirty="0" smtClean="0"/>
+              <a:t/>
+            </a:r>
+            <a:br>
+              <a:rPr lang="pt-BR" sz="1800" dirty="0" smtClean="0"/>
+            </a:br>
+            <a:endParaRPr lang="pt-BR" sz="1800" dirty="0"/>
+          </a:p>
+        </p:txBody>
+      </p:sp>
+      <p:pic>
+        <p:nvPicPr>
+          <p:cNvPr id="4098" name="Picture 2"/>
+          <p:cNvPicPr>
+            <a:picLocks noChangeAspect="1" noChangeArrowheads="1"/>
+          </p:cNvPicPr>
+          <p:nvPr/>
+        </p:nvPicPr>
+        <p:blipFill>
+          <a:blip r:embed="rId2">
+            <a:extLst>
+              <a:ext uri="{28A0092B-C50C-407E-A947-70E740481C1C}">
+                <a14:useLocalDpi xmlns:a14="http://schemas.microsoft.com/office/drawing/2010/main" val="0"/>
+              </a:ext>
+            </a:extLst>
+          </a:blip>
+          <a:srcRect/>
+          <a:stretch>
+            <a:fillRect/>
+          </a:stretch>
+        </p:blipFill>
+        <p:spPr bwMode="auto">
+          <a:xfrm>
+            <a:off x="97335" y="2780928"/>
+            <a:ext cx="8610748" cy="3209528"/>
+          </a:xfrm>
+          <a:prstGeom prst="rect">
+            <a:avLst/>
+          </a:prstGeom>
+          <a:noFill/>
+          <a:ln>
+            <a:noFill/>
+          </a:ln>
+          <a:extLst>
+            <a:ext uri="{909E8E84-426E-40DD-AFC4-6F175D3DCCD1}">
+              <a14:hiddenFill xmlns:a14="http://schemas.microsoft.com/office/drawing/2010/main">
+                <a:solidFill>
+                  <a:schemeClr val="accent1"/>
+                </a:solidFill>
+              </a14:hiddenFill>
+            </a:ext>
+            <a:ext uri="{91240B29-F687-4F45-9708-019B960494DF}">
+              <a14:hiddenLine xmlns:a14="http://schemas.microsoft.com/office/drawing/2010/main" w="9525">
+                <a:solidFill>
+                  <a:schemeClr val="tx1"/>
+                </a:solidFill>
+                <a:miter lim="800000"/>
+                <a:headEnd/>
+                <a:tailEnd/>
+              </a14:hiddenLine>
+            </a:ext>
+          </a:extLst>
+        </p:spPr>
+      </p:pic>
+    </p:spTree>
+    <p:extLst>
+      <p:ext uri="{BB962C8B-B14F-4D97-AF65-F5344CB8AC3E}">
+        <p14:creationId xmlns:p14="http://schemas.microsoft.com/office/powerpoint/2010/main" val="4007991885"/>
+      </p:ext>
+    </p:extLst>
+  </p:cSld>
+  <p:clrMapOvr>
+    <a:masterClrMapping/>
+  </p:clrMapOvr>
+</p:sld>
+</file>
+
 <file path=ppt/slides/slide2.xml><?xml version="1.0" encoding="utf-8"?>
 <p:sld xmlns:a="http://schemas.openxmlformats.org/drawingml/2006/main" xmlns:r="http://schemas.openxmlformats.org/officeDocument/2006/relationships" xmlns:p="http://schemas.openxmlformats.org/presentationml/2006/main">
   <p:cSld>
@@ -3973,8 +4711,8 @@
               <a:t>Serviço </a:t>
             </a:r>
             <a:r>
-              <a:rPr lang="pt-BR" dirty="0" err="1" smtClean="0"/>
-              <a:t>Autenticaço</a:t>
+              <a:rPr lang="pt-BR" dirty="0" smtClean="0"/>
+              <a:t>Autenticação</a:t>
             </a:r>
             <a:endParaRPr lang="pt-BR" dirty="0" smtClean="0"/>
           </a:p>
@@ -4594,6 +5332,836 @@
     <p:extLst>
       <p:ext uri="{BB962C8B-B14F-4D97-AF65-F5344CB8AC3E}">
         <p14:creationId xmlns:p14="http://schemas.microsoft.com/office/powerpoint/2010/main" val="22149443"/>
+      </p:ext>
+    </p:extLst>
+  </p:cSld>
+  <p:clrMapOvr>
+    <a:masterClrMapping/>
+  </p:clrMapOvr>
+</p:sld>
+</file>
+
+<file path=ppt/slides/slide6.xml><?xml version="1.0" encoding="utf-8"?>
+<p:sld xmlns:a="http://schemas.openxmlformats.org/drawingml/2006/main" xmlns:r="http://schemas.openxmlformats.org/officeDocument/2006/relationships" xmlns:p="http://schemas.openxmlformats.org/presentationml/2006/main">
+  <p:cSld>
+    <p:spTree>
+      <p:nvGrpSpPr>
+        <p:cNvPr id="1" name=""/>
+        <p:cNvGrpSpPr/>
+        <p:nvPr/>
+      </p:nvGrpSpPr>
+      <p:grpSpPr>
+        <a:xfrm>
+          <a:off x="0" y="0"/>
+          <a:ext cx="0" cy="0"/>
+          <a:chOff x="0" y="0"/>
+          <a:chExt cx="0" cy="0"/>
+        </a:xfrm>
+      </p:grpSpPr>
+      <p:sp>
+        <p:nvSpPr>
+          <p:cNvPr id="2" name="Título 1"/>
+          <p:cNvSpPr>
+            <a:spLocks noGrp="1"/>
+          </p:cNvSpPr>
+          <p:nvPr>
+            <p:ph type="title"/>
+          </p:nvPr>
+        </p:nvSpPr>
+        <p:spPr/>
+        <p:txBody>
+          <a:bodyPr/>
+          <a:lstStyle/>
+          <a:p>
+            <a:r>
+              <a:rPr lang="pt-BR" dirty="0" smtClean="0"/>
+              <a:t>Artefatos</a:t>
+            </a:r>
+            <a:endParaRPr lang="pt-BR" dirty="0"/>
+          </a:p>
+        </p:txBody>
+      </p:sp>
+      <p:sp>
+        <p:nvSpPr>
+          <p:cNvPr id="3" name="Espaço Reservado para Conteúdo 2"/>
+          <p:cNvSpPr>
+            <a:spLocks noGrp="1"/>
+          </p:cNvSpPr>
+          <p:nvPr>
+            <p:ph idx="1"/>
+          </p:nvPr>
+        </p:nvSpPr>
+        <p:spPr/>
+        <p:txBody>
+          <a:bodyPr/>
+          <a:lstStyle/>
+          <a:p>
+            <a:r>
+              <a:rPr lang="pt-BR" dirty="0" err="1" smtClean="0"/>
+              <a:t>siplad-service-discovery</a:t>
+            </a:r>
+            <a:endParaRPr lang="pt-BR" dirty="0" smtClean="0"/>
+          </a:p>
+          <a:p>
+            <a:r>
+              <a:rPr lang="pt-BR" dirty="0" err="1" smtClean="0"/>
+              <a:t>siplad</a:t>
+            </a:r>
+            <a:r>
+              <a:rPr lang="pt-BR" dirty="0" smtClean="0"/>
+              <a:t>-</a:t>
+            </a:r>
+            <a:r>
+              <a:rPr lang="pt-BR" dirty="0" err="1" smtClean="0"/>
+              <a:t>service</a:t>
+            </a:r>
+            <a:r>
+              <a:rPr lang="pt-BR" dirty="0" smtClean="0"/>
+              <a:t>-core</a:t>
+            </a:r>
+          </a:p>
+          <a:p>
+            <a:r>
+              <a:rPr lang="pt-BR" dirty="0" err="1" smtClean="0"/>
+              <a:t>siplad</a:t>
+            </a:r>
+            <a:r>
+              <a:rPr lang="pt-BR" dirty="0" smtClean="0"/>
+              <a:t>-gateway</a:t>
+            </a:r>
+          </a:p>
+          <a:p>
+            <a:r>
+              <a:rPr lang="pt-BR" dirty="0" err="1"/>
+              <a:t>s</a:t>
+            </a:r>
+            <a:r>
+              <a:rPr lang="pt-BR" dirty="0" err="1" smtClean="0"/>
+              <a:t>iplad</a:t>
+            </a:r>
+            <a:r>
+              <a:rPr lang="pt-BR" dirty="0" smtClean="0"/>
+              <a:t>-</a:t>
+            </a:r>
+            <a:r>
+              <a:rPr lang="pt-BR" dirty="0" err="1" smtClean="0"/>
+              <a:t>service</a:t>
+            </a:r>
+            <a:r>
+              <a:rPr lang="pt-BR" dirty="0" smtClean="0"/>
+              <a:t>-apoio</a:t>
+            </a:r>
+          </a:p>
+          <a:p>
+            <a:r>
+              <a:rPr lang="pt-BR" dirty="0" err="1"/>
+              <a:t>s</a:t>
+            </a:r>
+            <a:r>
+              <a:rPr lang="pt-BR" dirty="0" err="1" smtClean="0"/>
+              <a:t>iplad-service-autenticacao</a:t>
+            </a:r>
+            <a:endParaRPr lang="pt-BR" dirty="0" smtClean="0"/>
+          </a:p>
+          <a:p>
+            <a:endParaRPr lang="pt-BR" dirty="0" smtClean="0"/>
+          </a:p>
+          <a:p>
+            <a:endParaRPr lang="pt-BR" dirty="0"/>
+          </a:p>
+        </p:txBody>
+      </p:sp>
+    </p:spTree>
+    <p:extLst>
+      <p:ext uri="{BB962C8B-B14F-4D97-AF65-F5344CB8AC3E}">
+        <p14:creationId xmlns:p14="http://schemas.microsoft.com/office/powerpoint/2010/main" val="2482802374"/>
+      </p:ext>
+    </p:extLst>
+  </p:cSld>
+  <p:clrMapOvr>
+    <a:masterClrMapping/>
+  </p:clrMapOvr>
+</p:sld>
+</file>
+
+<file path=ppt/slides/slide7.xml><?xml version="1.0" encoding="utf-8"?>
+<p:sld xmlns:a="http://schemas.openxmlformats.org/drawingml/2006/main" xmlns:r="http://schemas.openxmlformats.org/officeDocument/2006/relationships" xmlns:p="http://schemas.openxmlformats.org/presentationml/2006/main">
+  <p:cSld>
+    <p:spTree>
+      <p:nvGrpSpPr>
+        <p:cNvPr id="1" name=""/>
+        <p:cNvGrpSpPr/>
+        <p:nvPr/>
+      </p:nvGrpSpPr>
+      <p:grpSpPr>
+        <a:xfrm>
+          <a:off x="0" y="0"/>
+          <a:ext cx="0" cy="0"/>
+          <a:chOff x="0" y="0"/>
+          <a:chExt cx="0" cy="0"/>
+        </a:xfrm>
+      </p:grpSpPr>
+      <p:sp>
+        <p:nvSpPr>
+          <p:cNvPr id="2" name="Título 1"/>
+          <p:cNvSpPr>
+            <a:spLocks noGrp="1"/>
+          </p:cNvSpPr>
+          <p:nvPr>
+            <p:ph type="title"/>
+          </p:nvPr>
+        </p:nvSpPr>
+        <p:spPr/>
+        <p:txBody>
+          <a:bodyPr>
+            <a:normAutofit fontScale="90000"/>
+          </a:bodyPr>
+          <a:lstStyle/>
+          <a:p>
+            <a:pPr algn="l"/>
+            <a:r>
+              <a:rPr lang="pt-BR" dirty="0" smtClean="0"/>
+              <a:t>Artefatos </a:t>
+            </a:r>
+            <a:br>
+              <a:rPr lang="pt-BR" dirty="0" smtClean="0"/>
+            </a:br>
+            <a:r>
+              <a:rPr lang="pt-BR" dirty="0" err="1" smtClean="0"/>
+              <a:t>siplad</a:t>
+            </a:r>
+            <a:r>
+              <a:rPr lang="pt-BR" dirty="0" smtClean="0"/>
+              <a:t>-</a:t>
+            </a:r>
+            <a:r>
+              <a:rPr lang="pt-BR" dirty="0" err="1" smtClean="0"/>
+              <a:t>service</a:t>
+            </a:r>
+            <a:r>
+              <a:rPr lang="pt-BR" dirty="0" smtClean="0"/>
+              <a:t>-core</a:t>
+            </a:r>
+            <a:endParaRPr lang="pt-BR" dirty="0"/>
+          </a:p>
+        </p:txBody>
+      </p:sp>
+      <p:sp>
+        <p:nvSpPr>
+          <p:cNvPr id="4" name="Espaço Reservado para Conteúdo 3"/>
+          <p:cNvSpPr>
+            <a:spLocks noGrp="1"/>
+          </p:cNvSpPr>
+          <p:nvPr>
+            <p:ph idx="1"/>
+          </p:nvPr>
+        </p:nvSpPr>
+        <p:spPr/>
+        <p:txBody>
+          <a:bodyPr>
+            <a:normAutofit/>
+          </a:bodyPr>
+          <a:lstStyle/>
+          <a:p>
+            <a:pPr>
+              <a:buFontTx/>
+              <a:buChar char="-"/>
+            </a:pPr>
+            <a:r>
+              <a:rPr lang="pt-BR" sz="1600" dirty="0" smtClean="0"/>
+              <a:t>Classes comuns aos serviços</a:t>
+            </a:r>
+          </a:p>
+          <a:p>
+            <a:pPr>
+              <a:buFontTx/>
+              <a:buChar char="-"/>
+            </a:pPr>
+            <a:r>
+              <a:rPr lang="pt-BR" sz="1600" dirty="0" smtClean="0"/>
+              <a:t>Possui as interfaces remotas às </a:t>
+            </a:r>
+            <a:r>
+              <a:rPr lang="pt-BR" sz="1600" dirty="0" err="1" smtClean="0"/>
+              <a:t>APIs</a:t>
+            </a:r>
+            <a:r>
+              <a:rPr lang="pt-BR" sz="1600" dirty="0" smtClean="0"/>
+              <a:t> (@</a:t>
+            </a:r>
+            <a:r>
+              <a:rPr lang="pt-BR" sz="1600" dirty="0" err="1" smtClean="0"/>
+              <a:t>FeignClient</a:t>
+            </a:r>
+            <a:r>
+              <a:rPr lang="pt-BR" sz="1600" dirty="0" smtClean="0"/>
+              <a:t> </a:t>
+            </a:r>
+            <a:r>
+              <a:rPr lang="pt-BR" sz="1800" dirty="0" smtClean="0"/>
+              <a:t>)</a:t>
+            </a:r>
+          </a:p>
+          <a:p>
+            <a:pPr>
+              <a:buFontTx/>
+              <a:buChar char="-"/>
+            </a:pPr>
+            <a:r>
+              <a:rPr lang="pt-BR" sz="1800" dirty="0" smtClean="0"/>
+              <a:t>Possui os </a:t>
+            </a:r>
+            <a:r>
+              <a:rPr lang="pt-BR" sz="1800" dirty="0" err="1" smtClean="0"/>
+              <a:t>DTOs</a:t>
+            </a:r>
+            <a:r>
+              <a:rPr lang="pt-BR" sz="1800" dirty="0" smtClean="0"/>
+              <a:t> que serão utilizados entre as</a:t>
+            </a:r>
+            <a:br>
+              <a:rPr lang="pt-BR" sz="1800" dirty="0" smtClean="0"/>
+            </a:br>
+            <a:r>
+              <a:rPr lang="pt-BR" sz="1800" dirty="0" smtClean="0"/>
+              <a:t>chamadas remotas</a:t>
+            </a:r>
+          </a:p>
+          <a:p>
+            <a:pPr>
+              <a:buFontTx/>
+              <a:buChar char="-"/>
+            </a:pPr>
+            <a:r>
+              <a:rPr lang="pt-BR" sz="1800" dirty="0" smtClean="0"/>
+              <a:t>Possui as classes responsáveis pela segurança</a:t>
+            </a:r>
+            <a:br>
+              <a:rPr lang="pt-BR" sz="1800" dirty="0" smtClean="0"/>
+            </a:br>
+            <a:r>
+              <a:rPr lang="pt-BR" sz="1800" dirty="0" smtClean="0"/>
+              <a:t>dos serviços. Lembrando que tudo é feito pelo</a:t>
+            </a:r>
+            <a:br>
+              <a:rPr lang="pt-BR" sz="1800" dirty="0" smtClean="0"/>
+            </a:br>
+            <a:r>
+              <a:rPr lang="pt-BR" sz="1800" dirty="0" smtClean="0"/>
+              <a:t>Spring, basta seguir o modelo dos pacotes nos</a:t>
+            </a:r>
+            <a:br>
+              <a:rPr lang="pt-BR" sz="1800" dirty="0" smtClean="0"/>
+            </a:br>
+            <a:r>
+              <a:rPr lang="pt-BR" sz="1800" dirty="0" smtClean="0"/>
+              <a:t>serviços que o Spring se resolve, isto é,</a:t>
+            </a:r>
+            <a:br>
+              <a:rPr lang="pt-BR" sz="1800" dirty="0" smtClean="0"/>
+            </a:br>
+            <a:r>
+              <a:rPr lang="pt-BR" sz="1800" dirty="0" smtClean="0"/>
+              <a:t>todas as classes estarem a partir do pacote</a:t>
+            </a:r>
+            <a:br>
+              <a:rPr lang="pt-BR" sz="1800" dirty="0" smtClean="0"/>
+            </a:br>
+            <a:r>
+              <a:rPr lang="pt-BR" sz="1800" dirty="0" err="1" smtClean="0"/>
+              <a:t>mb.dgom.siplad</a:t>
+            </a:r>
+            <a:r>
+              <a:rPr lang="pt-BR" sz="1800" dirty="0" smtClean="0"/>
+              <a:t> e a classe </a:t>
+            </a:r>
+            <a:r>
+              <a:rPr lang="pt-BR" sz="1800" dirty="0" err="1" smtClean="0"/>
+              <a:t>main</a:t>
+            </a:r>
+            <a:r>
+              <a:rPr lang="pt-BR" sz="1800" dirty="0" smtClean="0"/>
+              <a:t>, que possui a</a:t>
+            </a:r>
+            <a:br>
+              <a:rPr lang="pt-BR" sz="1800" dirty="0" smtClean="0"/>
+            </a:br>
+            <a:r>
+              <a:rPr lang="pt-BR" sz="1800" dirty="0" smtClean="0"/>
+              <a:t>chamada a </a:t>
+            </a:r>
+            <a:r>
+              <a:rPr lang="pt-BR" sz="1800" dirty="0" err="1" smtClean="0"/>
+              <a:t>SpringApplication.</a:t>
+            </a:r>
+            <a:r>
+              <a:rPr lang="pt-BR" sz="1800" i="1" dirty="0" err="1" smtClean="0"/>
+              <a:t>run</a:t>
+            </a:r>
+            <a:r>
+              <a:rPr lang="pt-BR" sz="1800" i="1" dirty="0" smtClean="0"/>
+              <a:t> </a:t>
+            </a:r>
+            <a:r>
+              <a:rPr lang="pt-BR" sz="1800" dirty="0" smtClean="0"/>
+              <a:t>estar neste</a:t>
+            </a:r>
+            <a:br>
+              <a:rPr lang="pt-BR" sz="1800" dirty="0" smtClean="0"/>
+            </a:br>
+            <a:r>
+              <a:rPr lang="pt-BR" sz="1800" dirty="0" smtClean="0"/>
+              <a:t>pacote.</a:t>
+            </a:r>
+          </a:p>
+          <a:p>
+            <a:pPr marL="0" indent="0">
+              <a:buNone/>
+            </a:pPr>
+            <a:r>
+              <a:rPr lang="pt-BR" sz="1800" dirty="0" smtClean="0"/>
+              <a:t/>
+            </a:r>
+            <a:br>
+              <a:rPr lang="pt-BR" sz="1800" dirty="0" smtClean="0"/>
+            </a:br>
+            <a:endParaRPr lang="pt-BR" sz="1800" dirty="0" smtClean="0"/>
+          </a:p>
+        </p:txBody>
+      </p:sp>
+      <p:pic>
+        <p:nvPicPr>
+          <p:cNvPr id="1027" name="Picture 3"/>
+          <p:cNvPicPr>
+            <a:picLocks noChangeAspect="1" noChangeArrowheads="1"/>
+          </p:cNvPicPr>
+          <p:nvPr/>
+        </p:nvPicPr>
+        <p:blipFill>
+          <a:blip r:embed="rId2">
+            <a:extLst>
+              <a:ext uri="{28A0092B-C50C-407E-A947-70E740481C1C}">
+                <a14:useLocalDpi xmlns:a14="http://schemas.microsoft.com/office/drawing/2010/main" val="0"/>
+              </a:ext>
+            </a:extLst>
+          </a:blip>
+          <a:srcRect/>
+          <a:stretch>
+            <a:fillRect/>
+          </a:stretch>
+        </p:blipFill>
+        <p:spPr bwMode="auto">
+          <a:xfrm>
+            <a:off x="5580112" y="188640"/>
+            <a:ext cx="3263627" cy="6289453"/>
+          </a:xfrm>
+          <a:prstGeom prst="rect">
+            <a:avLst/>
+          </a:prstGeom>
+          <a:noFill/>
+          <a:ln>
+            <a:noFill/>
+          </a:ln>
+          <a:extLst>
+            <a:ext uri="{909E8E84-426E-40DD-AFC4-6F175D3DCCD1}">
+              <a14:hiddenFill xmlns:a14="http://schemas.microsoft.com/office/drawing/2010/main">
+                <a:solidFill>
+                  <a:schemeClr val="accent1"/>
+                </a:solidFill>
+              </a14:hiddenFill>
+            </a:ext>
+            <a:ext uri="{91240B29-F687-4F45-9708-019B960494DF}">
+              <a14:hiddenLine xmlns:a14="http://schemas.microsoft.com/office/drawing/2010/main" w="9525">
+                <a:solidFill>
+                  <a:schemeClr val="tx1"/>
+                </a:solidFill>
+                <a:miter lim="800000"/>
+                <a:headEnd/>
+                <a:tailEnd/>
+              </a14:hiddenLine>
+            </a:ext>
+          </a:extLst>
+        </p:spPr>
+      </p:pic>
+    </p:spTree>
+    <p:extLst>
+      <p:ext uri="{BB962C8B-B14F-4D97-AF65-F5344CB8AC3E}">
+        <p14:creationId xmlns:p14="http://schemas.microsoft.com/office/powerpoint/2010/main" val="3313797960"/>
+      </p:ext>
+    </p:extLst>
+  </p:cSld>
+  <p:clrMapOvr>
+    <a:masterClrMapping/>
+  </p:clrMapOvr>
+</p:sld>
+</file>
+
+<file path=ppt/slides/slide8.xml><?xml version="1.0" encoding="utf-8"?>
+<p:sld xmlns:a="http://schemas.openxmlformats.org/drawingml/2006/main" xmlns:r="http://schemas.openxmlformats.org/officeDocument/2006/relationships" xmlns:p="http://schemas.openxmlformats.org/presentationml/2006/main">
+  <p:cSld>
+    <p:spTree>
+      <p:nvGrpSpPr>
+        <p:cNvPr id="1" name=""/>
+        <p:cNvGrpSpPr/>
+        <p:nvPr/>
+      </p:nvGrpSpPr>
+      <p:grpSpPr>
+        <a:xfrm>
+          <a:off x="0" y="0"/>
+          <a:ext cx="0" cy="0"/>
+          <a:chOff x="0" y="0"/>
+          <a:chExt cx="0" cy="0"/>
+        </a:xfrm>
+      </p:grpSpPr>
+      <p:sp>
+        <p:nvSpPr>
+          <p:cNvPr id="2" name="Título 1"/>
+          <p:cNvSpPr>
+            <a:spLocks noGrp="1"/>
+          </p:cNvSpPr>
+          <p:nvPr>
+            <p:ph type="title"/>
+          </p:nvPr>
+        </p:nvSpPr>
+        <p:spPr/>
+        <p:txBody>
+          <a:bodyPr>
+            <a:normAutofit fontScale="90000"/>
+          </a:bodyPr>
+          <a:lstStyle/>
+          <a:p>
+            <a:r>
+              <a:rPr lang="pt-BR" dirty="0" smtClean="0"/>
+              <a:t>Artefatos</a:t>
+            </a:r>
+            <a:br>
+              <a:rPr lang="pt-BR" dirty="0" smtClean="0"/>
+            </a:br>
+            <a:r>
+              <a:rPr lang="pt-BR" dirty="0" err="1" smtClean="0"/>
+              <a:t>siplad-service-discovery</a:t>
+            </a:r>
+            <a:endParaRPr lang="pt-BR" dirty="0"/>
+          </a:p>
+        </p:txBody>
+      </p:sp>
+      <p:sp>
+        <p:nvSpPr>
+          <p:cNvPr id="3" name="Espaço Reservado para Conteúdo 2"/>
+          <p:cNvSpPr>
+            <a:spLocks noGrp="1"/>
+          </p:cNvSpPr>
+          <p:nvPr>
+            <p:ph idx="1"/>
+          </p:nvPr>
+        </p:nvSpPr>
+        <p:spPr/>
+        <p:txBody>
+          <a:bodyPr/>
+          <a:lstStyle/>
+          <a:p>
+            <a:r>
+              <a:rPr lang="pt-BR" sz="1800" dirty="0" smtClean="0"/>
+              <a:t>Aplicação responsável por implementar o </a:t>
+            </a:r>
+            <a:r>
+              <a:rPr lang="pt-BR" sz="1800" dirty="0" err="1" smtClean="0"/>
+              <a:t>Pattern</a:t>
+            </a:r>
+            <a:r>
+              <a:rPr lang="pt-BR" sz="1800" dirty="0" smtClean="0"/>
+              <a:t> Service Discovery</a:t>
+            </a:r>
+          </a:p>
+          <a:p>
+            <a:r>
+              <a:rPr lang="pt-BR" sz="1800" dirty="0" smtClean="0"/>
+              <a:t>Abaixo podemos ver o painel do </a:t>
+            </a:r>
+            <a:r>
+              <a:rPr lang="pt-BR" sz="1800" dirty="0" err="1" smtClean="0"/>
+              <a:t>Eureka</a:t>
+            </a:r>
+            <a:r>
+              <a:rPr lang="pt-BR" sz="1800" dirty="0" smtClean="0"/>
+              <a:t> com os serviços registrados</a:t>
+            </a:r>
+          </a:p>
+          <a:p>
+            <a:endParaRPr lang="pt-BR" sz="1800" dirty="0" smtClean="0"/>
+          </a:p>
+          <a:p>
+            <a:pPr marL="0" indent="0">
+              <a:buNone/>
+            </a:pPr>
+            <a:r>
+              <a:rPr lang="pt-BR" dirty="0" smtClean="0"/>
+              <a:t/>
+            </a:r>
+            <a:br>
+              <a:rPr lang="pt-BR" dirty="0" smtClean="0"/>
+            </a:br>
+            <a:endParaRPr lang="pt-BR" dirty="0"/>
+          </a:p>
+        </p:txBody>
+      </p:sp>
+      <p:pic>
+        <p:nvPicPr>
+          <p:cNvPr id="2050" name="Picture 2"/>
+          <p:cNvPicPr>
+            <a:picLocks noChangeAspect="1" noChangeArrowheads="1"/>
+          </p:cNvPicPr>
+          <p:nvPr/>
+        </p:nvPicPr>
+        <p:blipFill>
+          <a:blip r:embed="rId2">
+            <a:extLst>
+              <a:ext uri="{28A0092B-C50C-407E-A947-70E740481C1C}">
+                <a14:useLocalDpi xmlns:a14="http://schemas.microsoft.com/office/drawing/2010/main" val="0"/>
+              </a:ext>
+            </a:extLst>
+          </a:blip>
+          <a:srcRect/>
+          <a:stretch>
+            <a:fillRect/>
+          </a:stretch>
+        </p:blipFill>
+        <p:spPr bwMode="auto">
+          <a:xfrm>
+            <a:off x="755576" y="2420888"/>
+            <a:ext cx="7620002" cy="3300413"/>
+          </a:xfrm>
+          <a:prstGeom prst="rect">
+            <a:avLst/>
+          </a:prstGeom>
+          <a:noFill/>
+          <a:ln>
+            <a:noFill/>
+          </a:ln>
+          <a:extLst>
+            <a:ext uri="{909E8E84-426E-40DD-AFC4-6F175D3DCCD1}">
+              <a14:hiddenFill xmlns:a14="http://schemas.microsoft.com/office/drawing/2010/main">
+                <a:solidFill>
+                  <a:schemeClr val="accent1"/>
+                </a:solidFill>
+              </a14:hiddenFill>
+            </a:ext>
+            <a:ext uri="{91240B29-F687-4F45-9708-019B960494DF}">
+              <a14:hiddenLine xmlns:a14="http://schemas.microsoft.com/office/drawing/2010/main" w="9525">
+                <a:solidFill>
+                  <a:schemeClr val="tx1"/>
+                </a:solidFill>
+                <a:miter lim="800000"/>
+                <a:headEnd/>
+                <a:tailEnd/>
+              </a14:hiddenLine>
+            </a:ext>
+          </a:extLst>
+        </p:spPr>
+      </p:pic>
+    </p:spTree>
+    <p:extLst>
+      <p:ext uri="{BB962C8B-B14F-4D97-AF65-F5344CB8AC3E}">
+        <p14:creationId xmlns:p14="http://schemas.microsoft.com/office/powerpoint/2010/main" val="1622267807"/>
+      </p:ext>
+    </p:extLst>
+  </p:cSld>
+  <p:clrMapOvr>
+    <a:masterClrMapping/>
+  </p:clrMapOvr>
+</p:sld>
+</file>
+
+<file path=ppt/slides/slide9.xml><?xml version="1.0" encoding="utf-8"?>
+<p:sld xmlns:a="http://schemas.openxmlformats.org/drawingml/2006/main" xmlns:r="http://schemas.openxmlformats.org/officeDocument/2006/relationships" xmlns:p="http://schemas.openxmlformats.org/presentationml/2006/main">
+  <p:cSld>
+    <p:spTree>
+      <p:nvGrpSpPr>
+        <p:cNvPr id="1" name=""/>
+        <p:cNvGrpSpPr/>
+        <p:nvPr/>
+      </p:nvGrpSpPr>
+      <p:grpSpPr>
+        <a:xfrm>
+          <a:off x="0" y="0"/>
+          <a:ext cx="0" cy="0"/>
+          <a:chOff x="0" y="0"/>
+          <a:chExt cx="0" cy="0"/>
+        </a:xfrm>
+      </p:grpSpPr>
+      <p:sp>
+        <p:nvSpPr>
+          <p:cNvPr id="2" name="Título 1"/>
+          <p:cNvSpPr>
+            <a:spLocks noGrp="1"/>
+          </p:cNvSpPr>
+          <p:nvPr>
+            <p:ph type="title"/>
+          </p:nvPr>
+        </p:nvSpPr>
+        <p:spPr/>
+        <p:txBody>
+          <a:bodyPr>
+            <a:normAutofit fontScale="90000"/>
+          </a:bodyPr>
+          <a:lstStyle/>
+          <a:p>
+            <a:r>
+              <a:rPr lang="pt-BR" dirty="0" smtClean="0"/>
+              <a:t>Artefatos</a:t>
+            </a:r>
+            <a:br>
+              <a:rPr lang="pt-BR" dirty="0" smtClean="0"/>
+            </a:br>
+            <a:r>
+              <a:rPr lang="pt-BR" dirty="0" err="1" smtClean="0"/>
+              <a:t>siplad</a:t>
+            </a:r>
+            <a:r>
+              <a:rPr lang="pt-BR" dirty="0" smtClean="0"/>
+              <a:t>-gateway</a:t>
+            </a:r>
+            <a:endParaRPr lang="pt-BR" dirty="0"/>
+          </a:p>
+        </p:txBody>
+      </p:sp>
+      <p:sp>
+        <p:nvSpPr>
+          <p:cNvPr id="3" name="Espaço Reservado para Conteúdo 2"/>
+          <p:cNvSpPr>
+            <a:spLocks noGrp="1"/>
+          </p:cNvSpPr>
+          <p:nvPr>
+            <p:ph idx="1"/>
+          </p:nvPr>
+        </p:nvSpPr>
+        <p:spPr/>
+        <p:txBody>
+          <a:bodyPr>
+            <a:normAutofit/>
+          </a:bodyPr>
+          <a:lstStyle/>
+          <a:p>
+            <a:r>
+              <a:rPr lang="pt-BR" sz="1800" dirty="0" smtClean="0"/>
+              <a:t>O Gateway é o ponto de entrada para o ecossistema dos micro serviços</a:t>
+            </a:r>
+          </a:p>
+          <a:p>
+            <a:r>
+              <a:rPr lang="pt-BR" sz="1800" dirty="0" smtClean="0"/>
+              <a:t>As chamadas feitas pelos clientes (</a:t>
+            </a:r>
+            <a:r>
+              <a:rPr lang="pt-BR" sz="1800" dirty="0" err="1" smtClean="0"/>
+              <a:t>React</a:t>
+            </a:r>
+            <a:r>
+              <a:rPr lang="pt-BR" sz="1800" dirty="0" smtClean="0"/>
+              <a:t>, Angular, Aplicação Desktop) irão bater neste serviço que será responsável por:</a:t>
+            </a:r>
+          </a:p>
+          <a:p>
+            <a:pPr lvl="1"/>
+            <a:r>
+              <a:rPr lang="pt-BR" sz="1400" dirty="0" smtClean="0"/>
+              <a:t>Mapear as rotas para os serviços ( A localização dos serviços é feita com a ajuda do </a:t>
+            </a:r>
+            <a:r>
+              <a:rPr lang="pt-BR" sz="1400" dirty="0" err="1" smtClean="0"/>
+              <a:t>service</a:t>
+            </a:r>
+            <a:r>
+              <a:rPr lang="pt-BR" sz="1400" dirty="0" smtClean="0"/>
+              <a:t> </a:t>
+            </a:r>
+            <a:r>
+              <a:rPr lang="pt-BR" sz="1400" dirty="0" err="1" smtClean="0"/>
+              <a:t>discovery</a:t>
+            </a:r>
+            <a:r>
+              <a:rPr lang="pt-BR" sz="1400" dirty="0" smtClean="0"/>
+              <a:t>)</a:t>
+            </a:r>
+          </a:p>
+          <a:p>
+            <a:pPr lvl="1"/>
+            <a:r>
+              <a:rPr lang="pt-BR" sz="1400" dirty="0" smtClean="0"/>
+              <a:t>Aplicar a validação do TOKEN JWT primária ( Os serviços </a:t>
+            </a:r>
+            <a:r>
+              <a:rPr lang="pt-BR" sz="1400" dirty="0" err="1" smtClean="0"/>
+              <a:t>tbm</a:t>
+            </a:r>
+            <a:r>
+              <a:rPr lang="pt-BR" sz="1400" dirty="0" smtClean="0"/>
+              <a:t> possuem a validação, mas caso o </a:t>
+            </a:r>
+            <a:r>
+              <a:rPr lang="pt-BR" sz="1400" dirty="0" err="1" smtClean="0"/>
+              <a:t>token</a:t>
+            </a:r>
+            <a:r>
+              <a:rPr lang="pt-BR" sz="1400" dirty="0" smtClean="0"/>
+              <a:t> seja inválido, o Gateway já barra)</a:t>
+            </a:r>
+          </a:p>
+          <a:p>
+            <a:pPr lvl="1"/>
+            <a:r>
+              <a:rPr lang="pt-BR" sz="1400" dirty="0" smtClean="0"/>
+              <a:t>Isolar os serviços de acesso externo. Apenas a porta do Gateway será exposta</a:t>
+            </a:r>
+          </a:p>
+          <a:p>
+            <a:r>
+              <a:rPr lang="pt-BR" sz="1800" dirty="0" smtClean="0"/>
+              <a:t>Caso o gateway esteja sobrecarregado, podemos aumentar o número de instâncias dele em execução e colocar um </a:t>
+            </a:r>
+            <a:r>
+              <a:rPr lang="pt-BR" sz="1800" dirty="0" err="1" smtClean="0"/>
+              <a:t>Load</a:t>
+            </a:r>
+            <a:r>
+              <a:rPr lang="pt-BR" sz="1800" dirty="0" smtClean="0"/>
+              <a:t> </a:t>
+            </a:r>
+            <a:r>
+              <a:rPr lang="pt-BR" sz="1800" dirty="0" err="1" smtClean="0"/>
+              <a:t>Balancer</a:t>
+            </a:r>
+            <a:r>
+              <a:rPr lang="pt-BR" sz="1800" dirty="0" smtClean="0"/>
+              <a:t> na frente para distribuir a carga.</a:t>
+            </a:r>
+          </a:p>
+          <a:p>
+            <a:pPr lvl="1"/>
+            <a:r>
+              <a:rPr lang="pt-BR" sz="1400" dirty="0" smtClean="0"/>
+              <a:t>Simplesmente colocando um NGINX na frente.</a:t>
+            </a:r>
+          </a:p>
+          <a:p>
+            <a:pPr marL="457200" lvl="1" indent="0">
+              <a:buNone/>
+            </a:pPr>
+            <a:r>
+              <a:rPr lang="pt-BR" sz="1400" dirty="0" smtClean="0"/>
+              <a:t/>
+            </a:r>
+            <a:br>
+              <a:rPr lang="pt-BR" sz="1400" dirty="0" smtClean="0"/>
+            </a:br>
+            <a:endParaRPr lang="pt-BR" sz="1400" dirty="0" smtClean="0"/>
+          </a:p>
+        </p:txBody>
+      </p:sp>
+    </p:spTree>
+    <p:extLst>
+      <p:ext uri="{BB962C8B-B14F-4D97-AF65-F5344CB8AC3E}">
+        <p14:creationId xmlns:p14="http://schemas.microsoft.com/office/powerpoint/2010/main" val="2182700544"/>
       </p:ext>
     </p:extLst>
   </p:cSld>

</xml_diff>